<commit_message>
Changes to Documentation and PPT
</commit_message>
<xml_diff>
--- a/ComparativeProteinSequence.pptx
+++ b/ComparativeProteinSequence.pptx
@@ -1398,7 +1398,7 @@
           <a:p>
             <a:fld id="{4AE80D50-86C4-4E75-A9A5-E37063E4CC22}" type="datetimeFigureOut">
               <a:rPr lang="en-US" smtClean="0"/>
-              <a:t>11/30/2016</a:t>
+              <a:t>12/7/2016</a:t>
             </a:fld>
             <a:endParaRPr lang="en-US"/>
           </a:p>
@@ -1794,7 +1794,7 @@
           <a:p>
             <a:fld id="{30C66A6D-F989-4EC4-8F9E-A3329706D682}" type="datetime1">
               <a:rPr lang="en-US" smtClean="0"/>
-              <a:t>11/30/2016</a:t>
+              <a:t>12/7/2016</a:t>
             </a:fld>
             <a:endParaRPr lang="en-US"/>
           </a:p>
@@ -1965,7 +1965,7 @@
           <a:p>
             <a:fld id="{244054AA-5E0C-497D-AC9E-2D24CD6655C1}" type="datetime1">
               <a:rPr lang="en-US" smtClean="0"/>
-              <a:t>11/30/2016</a:t>
+              <a:t>12/7/2016</a:t>
             </a:fld>
             <a:endParaRPr lang="en-US"/>
           </a:p>
@@ -2146,7 +2146,7 @@
           <a:p>
             <a:fld id="{DD9FB7E8-0E6C-4955-A9F3-7AE291B03E0B}" type="datetime1">
               <a:rPr lang="en-US" smtClean="0"/>
-              <a:t>11/30/2016</a:t>
+              <a:t>12/7/2016</a:t>
             </a:fld>
             <a:endParaRPr lang="en-US"/>
           </a:p>
@@ -2317,7 +2317,7 @@
           <a:p>
             <a:fld id="{39A7CB58-BB33-46F7-A434-F97A7221B99C}" type="datetime1">
               <a:rPr lang="en-US" smtClean="0"/>
-              <a:t>11/30/2016</a:t>
+              <a:t>12/7/2016</a:t>
             </a:fld>
             <a:endParaRPr lang="en-US"/>
           </a:p>
@@ -2565,7 +2565,7 @@
           <a:p>
             <a:fld id="{5D3C9F66-72DB-4234-A775-F9D2C9277BDF}" type="datetime1">
               <a:rPr lang="en-US" smtClean="0"/>
-              <a:t>11/30/2016</a:t>
+              <a:t>12/7/2016</a:t>
             </a:fld>
             <a:endParaRPr lang="en-US"/>
           </a:p>
@@ -2797,7 +2797,7 @@
           <a:p>
             <a:fld id="{D475F186-8ABA-4E59-9DF1-94CD3EA439A1}" type="datetime1">
               <a:rPr lang="en-US" smtClean="0"/>
-              <a:t>11/30/2016</a:t>
+              <a:t>12/7/2016</a:t>
             </a:fld>
             <a:endParaRPr lang="en-US"/>
           </a:p>
@@ -3164,7 +3164,7 @@
           <a:p>
             <a:fld id="{6377FFB3-418B-4222-8F57-C109B964DAB2}" type="datetime1">
               <a:rPr lang="en-US" smtClean="0"/>
-              <a:t>11/30/2016</a:t>
+              <a:t>12/7/2016</a:t>
             </a:fld>
             <a:endParaRPr lang="en-US"/>
           </a:p>
@@ -3284,7 +3284,7 @@
           <a:p>
             <a:fld id="{3BF838BC-2FC5-41BC-BF5C-329976C828BA}" type="datetime1">
               <a:rPr lang="en-US" smtClean="0"/>
-              <a:t>11/30/2016</a:t>
+              <a:t>12/7/2016</a:t>
             </a:fld>
             <a:endParaRPr lang="en-US"/>
           </a:p>
@@ -3382,7 +3382,7 @@
           <a:p>
             <a:fld id="{9825A280-D773-4BB8-9766-11B38554BEFB}" type="datetime1">
               <a:rPr lang="en-US" smtClean="0"/>
-              <a:t>11/30/2016</a:t>
+              <a:t>12/7/2016</a:t>
             </a:fld>
             <a:endParaRPr lang="en-US"/>
           </a:p>
@@ -3660,7 +3660,7 @@
           <a:p>
             <a:fld id="{02B8B5FD-45D2-4366-B800-F542608F3406}" type="datetime1">
               <a:rPr lang="en-US" smtClean="0"/>
-              <a:t>11/30/2016</a:t>
+              <a:t>12/7/2016</a:t>
             </a:fld>
             <a:endParaRPr lang="en-US"/>
           </a:p>
@@ -3915,7 +3915,7 @@
           <a:p>
             <a:fld id="{21DBE8E5-7384-457D-AA2E-746548A2AE9F}" type="datetime1">
               <a:rPr lang="en-US" smtClean="0"/>
-              <a:t>11/30/2016</a:t>
+              <a:t>12/7/2016</a:t>
             </a:fld>
             <a:endParaRPr lang="en-US"/>
           </a:p>
@@ -4129,7 +4129,7 @@
           <a:p>
             <a:fld id="{F1B85748-94F4-4614-9A48-7C67C90F9DB8}" type="datetime1">
               <a:rPr lang="en-US" smtClean="0"/>
-              <a:t>11/30/2016</a:t>
+              <a:t>12/7/2016</a:t>
             </a:fld>
             <a:endParaRPr lang="en-US"/>
           </a:p>
@@ -4794,18 +4794,18 @@
             </a:endParaRPr>
           </a:p>
           <a:p>
-            <a:pPr algn="r">
+            <a:pPr>
               <a:lnSpc>
                 <a:spcPct val="80000"/>
               </a:lnSpc>
             </a:pPr>
             <a:r>
-              <a:rPr lang="en-US" sz="2200" dirty="0" err="1">
+              <a:rPr lang="en-US" sz="2200">
                 <a:solidFill>
                   <a:schemeClr val="accent1"/>
                 </a:solidFill>
               </a:rPr>
-              <a:t>Deepika</a:t>
+              <a:t>Bio </a:t>
             </a:r>
             <a:r>
               <a:rPr lang="en-US" sz="2200" dirty="0">
@@ -4813,22 +4813,7 @@
                   <a:schemeClr val="accent1"/>
                 </a:solidFill>
               </a:rPr>
-              <a:t> Joseph</a:t>
-            </a:r>
-          </a:p>
-          <a:p>
-            <a:pPr>
-              <a:lnSpc>
-                <a:spcPct val="80000"/>
-              </a:lnSpc>
-            </a:pPr>
-            <a:r>
-              <a:rPr lang="en-US" sz="2200" dirty="0">
-                <a:solidFill>
-                  <a:schemeClr val="accent1"/>
-                </a:solidFill>
-              </a:rPr>
-              <a:t>Bio Informatics</a:t>
+              <a:t>Informatics</a:t>
             </a:r>
           </a:p>
           <a:p>

</xml_diff>